<commit_message>
add a slide linking embeddings to NNs
</commit_message>
<xml_diff>
--- a/presentations/multi-layer-neural-networks.pptx
+++ b/presentations/multi-layer-neural-networks.pptx
@@ -13,8 +13,8 @@
     <p:sldId id="4841" r:id="rId7"/>
     <p:sldId id="4842" r:id="rId8"/>
     <p:sldId id="4765" r:id="rId9"/>
-    <p:sldId id="4766" r:id="rId10"/>
-    <p:sldId id="4767" r:id="rId11"/>
+    <p:sldId id="4767" r:id="rId10"/>
+    <p:sldId id="4773" r:id="rId11"/>
     <p:sldId id="303" r:id="rId12"/>
   </p:sldIdLst>
   <p:sldSz cx="12192000" cy="6858000"/>
@@ -124,8 +124,8 @@
             <p14:sldId id="4841"/>
             <p14:sldId id="4842"/>
             <p14:sldId id="4765"/>
-            <p14:sldId id="4766"/>
             <p14:sldId id="4767"/>
+            <p14:sldId id="4773"/>
             <p14:sldId id="303"/>
           </p14:sldIdLst>
         </p14:section>
@@ -13243,53 +13243,6 @@
           <a:chExt cx="0" cy="0"/>
         </a:xfrm>
       </p:grpSpPr>
-      <p:pic>
-        <p:nvPicPr>
-          <p:cNvPr id="1026" name="Picture 2" descr="Data">
-            <a:extLst>
-              <a:ext uri="{FF2B5EF4-FFF2-40B4-BE49-F238E27FC236}">
-                <a16:creationId xmlns:a16="http://schemas.microsoft.com/office/drawing/2014/main" id="{83361A9B-8EFA-96E1-233F-87235F77B46C}"/>
-              </a:ext>
-            </a:extLst>
-          </p:cNvPr>
-          <p:cNvPicPr>
-            <a:picLocks noChangeAspect="1" noChangeArrowheads="1"/>
-          </p:cNvPicPr>
-          <p:nvPr/>
-        </p:nvPicPr>
-        <p:blipFill>
-          <a:blip r:embed="rId2">
-            <a:extLst>
-              <a:ext uri="{28A0092B-C50C-407E-A947-70E740481C1C}">
-                <a14:useLocalDpi xmlns:a14="http://schemas.microsoft.com/office/drawing/2010/main" val="0"/>
-              </a:ext>
-            </a:extLst>
-          </a:blip>
-          <a:srcRect/>
-          <a:stretch>
-            <a:fillRect/>
-          </a:stretch>
-        </p:blipFill>
-        <p:spPr bwMode="auto">
-          <a:xfrm>
-            <a:off x="4894449" y="1050549"/>
-            <a:ext cx="4894950" cy="3671212"/>
-          </a:xfrm>
-          <a:prstGeom prst="rect">
-            <a:avLst/>
-          </a:prstGeom>
-          <a:noFill/>
-          <a:extLst>
-            <a:ext uri="{909E8E84-426E-40DD-AFC4-6F175D3DCCD1}">
-              <a14:hiddenFill xmlns:a14="http://schemas.microsoft.com/office/drawing/2010/main">
-                <a:solidFill>
-                  <a:srgbClr val="FFFFFF"/>
-                </a:solidFill>
-              </a14:hiddenFill>
-            </a:ext>
-          </a:extLst>
-        </p:spPr>
-      </p:pic>
       <p:sp>
         <p:nvSpPr>
           <p:cNvPr id="2" name="Title 1">
@@ -13320,10 +13273,10 @@
       </p:sp>
       <p:grpSp>
         <p:nvGrpSpPr>
-          <p:cNvPr id="3" name="Group 2">
+          <p:cNvPr id="4" name="Group 3">
             <a:extLst>
               <a:ext uri="{FF2B5EF4-FFF2-40B4-BE49-F238E27FC236}">
-                <a16:creationId xmlns:a16="http://schemas.microsoft.com/office/drawing/2014/main" id="{5BE36A02-3311-30F1-556D-8F9023E8375E}"/>
+                <a16:creationId xmlns:a16="http://schemas.microsoft.com/office/drawing/2014/main" id="{A7272085-6B25-F554-6504-39CE87BF6AAA}"/>
               </a:ext>
             </a:extLst>
           </p:cNvPr>
@@ -13332,18 +13285,65 @@
         </p:nvGrpSpPr>
         <p:grpSpPr>
           <a:xfrm>
-            <a:off x="305330" y="985050"/>
-            <a:ext cx="3387900" cy="3261419"/>
-            <a:chOff x="305330" y="985050"/>
-            <a:chExt cx="3387900" cy="3261419"/>
+            <a:off x="480000" y="900000"/>
+            <a:ext cx="4894950" cy="3671212"/>
+            <a:chOff x="4894449" y="1050549"/>
+            <a:chExt cx="4894950" cy="3671212"/>
           </a:xfrm>
         </p:grpSpPr>
+        <p:pic>
+          <p:nvPicPr>
+            <p:cNvPr id="1026" name="Picture 2" descr="Data">
+              <a:extLst>
+                <a:ext uri="{FF2B5EF4-FFF2-40B4-BE49-F238E27FC236}">
+                  <a16:creationId xmlns:a16="http://schemas.microsoft.com/office/drawing/2014/main" id="{83361A9B-8EFA-96E1-233F-87235F77B46C}"/>
+                </a:ext>
+              </a:extLst>
+            </p:cNvPr>
+            <p:cNvPicPr>
+              <a:picLocks noChangeAspect="1" noChangeArrowheads="1"/>
+            </p:cNvPicPr>
+            <p:nvPr/>
+          </p:nvPicPr>
+          <p:blipFill>
+            <a:blip r:embed="rId2">
+              <a:extLst>
+                <a:ext uri="{28A0092B-C50C-407E-A947-70E740481C1C}">
+                  <a14:useLocalDpi xmlns:a14="http://schemas.microsoft.com/office/drawing/2010/main" val="0"/>
+                </a:ext>
+              </a:extLst>
+            </a:blip>
+            <a:srcRect/>
+            <a:stretch>
+              <a:fillRect/>
+            </a:stretch>
+          </p:blipFill>
+          <p:spPr bwMode="auto">
+            <a:xfrm>
+              <a:off x="4894449" y="1050549"/>
+              <a:ext cx="4894950" cy="3671212"/>
+            </a:xfrm>
+            <a:prstGeom prst="rect">
+              <a:avLst/>
+            </a:prstGeom>
+            <a:noFill/>
+            <a:extLst>
+              <a:ext uri="{909E8E84-426E-40DD-AFC4-6F175D3DCCD1}">
+                <a14:hiddenFill xmlns:a14="http://schemas.microsoft.com/office/drawing/2010/main">
+                  <a:solidFill>
+                    <a:srgbClr val="FFFFFF"/>
+                  </a:solidFill>
+                </a14:hiddenFill>
+              </a:ext>
+            </a:extLst>
+          </p:spPr>
+        </p:pic>
         <p:sp>
           <p:nvSpPr>
-            <p:cNvPr id="11" name="Rectangle 10">
+            <p:cNvPr id="32" name="Freeform 31">
               <a:extLst>
                 <a:ext uri="{FF2B5EF4-FFF2-40B4-BE49-F238E27FC236}">
-                  <a16:creationId xmlns:a16="http://schemas.microsoft.com/office/drawing/2014/main" id="{BC25E805-8937-A96D-DB4E-86862BB05D2D}"/>
+                  <a16:creationId xmlns:a16="http://schemas.microsoft.com/office/drawing/2014/main" id="{E01FFCB4-2ADB-E576-5807-73C1CC3DA7AA}"/>
                 </a:ext>
               </a:extLst>
             </p:cNvPr>
@@ -13352,17 +13352,74 @@
           </p:nvSpPr>
           <p:spPr>
             <a:xfrm>
-              <a:off x="775504" y="1107365"/>
-              <a:ext cx="2743200" cy="2743200"/>
+              <a:off x="5268667" y="1195665"/>
+              <a:ext cx="3946967" cy="2789499"/>
             </a:xfrm>
-            <a:prstGeom prst="rect">
+            <a:custGeom>
               <a:avLst/>
-            </a:prstGeom>
+              <a:gdLst>
+                <a:gd name="connsiteX0" fmla="*/ 0 w 3946967"/>
+                <a:gd name="connsiteY0" fmla="*/ 2789499 h 2789499"/>
+                <a:gd name="connsiteX1" fmla="*/ 1689903 w 3946967"/>
+                <a:gd name="connsiteY1" fmla="*/ 1122744 h 2789499"/>
+                <a:gd name="connsiteX2" fmla="*/ 2558005 w 3946967"/>
+                <a:gd name="connsiteY2" fmla="*/ 1689904 h 2789499"/>
+                <a:gd name="connsiteX3" fmla="*/ 3946967 w 3946967"/>
+                <a:gd name="connsiteY3" fmla="*/ 0 h 2789499"/>
+                <a:gd name="connsiteX4" fmla="*/ 3946967 w 3946967"/>
+                <a:gd name="connsiteY4" fmla="*/ 0 h 2789499"/>
+              </a:gdLst>
+              <a:ahLst/>
+              <a:cxnLst>
+                <a:cxn ang="0">
+                  <a:pos x="connsiteX0" y="connsiteY0"/>
+                </a:cxn>
+                <a:cxn ang="0">
+                  <a:pos x="connsiteX1" y="connsiteY1"/>
+                </a:cxn>
+                <a:cxn ang="0">
+                  <a:pos x="connsiteX2" y="connsiteY2"/>
+                </a:cxn>
+                <a:cxn ang="0">
+                  <a:pos x="connsiteX3" y="connsiteY3"/>
+                </a:cxn>
+                <a:cxn ang="0">
+                  <a:pos x="connsiteX4" y="connsiteY4"/>
+                </a:cxn>
+              </a:cxnLst>
+              <a:rect l="l" t="t" r="r" b="b"/>
+              <a:pathLst>
+                <a:path w="3946967" h="2789499">
+                  <a:moveTo>
+                    <a:pt x="0" y="2789499"/>
+                  </a:moveTo>
+                  <a:cubicBezTo>
+                    <a:pt x="631784" y="2047754"/>
+                    <a:pt x="1263569" y="1306010"/>
+                    <a:pt x="1689903" y="1122744"/>
+                  </a:cubicBezTo>
+                  <a:cubicBezTo>
+                    <a:pt x="2116237" y="939478"/>
+                    <a:pt x="2181828" y="1877028"/>
+                    <a:pt x="2558005" y="1689904"/>
+                  </a:cubicBezTo>
+                  <a:cubicBezTo>
+                    <a:pt x="2934182" y="1502780"/>
+                    <a:pt x="3946967" y="0"/>
+                    <a:pt x="3946967" y="0"/>
+                  </a:cubicBezTo>
+                  <a:lnTo>
+                    <a:pt x="3946967" y="0"/>
+                  </a:lnTo>
+                </a:path>
+              </a:pathLst>
+            </a:custGeom>
             <a:noFill/>
-            <a:ln>
+            <a:ln w="19050">
               <a:solidFill>
-                <a:schemeClr val="tx1"/>
+                <a:schemeClr val="accent1"/>
               </a:solidFill>
+              <a:prstDash val="dash"/>
             </a:ln>
             <a:effectLst/>
           </p:spPr>
@@ -13381,799 +13438,15 @@
             </a:fontRef>
           </p:style>
           <p:txBody>
-            <a:bodyPr rtlCol="0" anchor="t" anchorCtr="0"/>
+            <a:bodyPr rtlCol="0" anchor="ctr"/>
             <a:lstStyle/>
             <a:p>
-              <a:pPr algn="l"/>
-              <a:endParaRPr lang="en-US" sz="1400" b="1" dirty="0">
-                <a:solidFill>
-                  <a:schemeClr val="tx1"/>
-                </a:solidFill>
-                <a:cs typeface="Georgia"/>
-              </a:endParaRPr>
+              <a:pPr algn="ctr"/>
+              <a:endParaRPr lang="en-US"/>
             </a:p>
           </p:txBody>
         </p:sp>
-        <p:sp>
-          <p:nvSpPr>
-            <p:cNvPr id="5" name="Oval 4">
-              <a:extLst>
-                <a:ext uri="{FF2B5EF4-FFF2-40B4-BE49-F238E27FC236}">
-                  <a16:creationId xmlns:a16="http://schemas.microsoft.com/office/drawing/2014/main" id="{BBAA1B22-CFE8-B050-F239-3F730CACC9C1}"/>
-                </a:ext>
-              </a:extLst>
-            </p:cNvPr>
-            <p:cNvSpPr/>
-            <p:nvPr/>
-          </p:nvSpPr>
-          <p:spPr>
-            <a:xfrm>
-              <a:off x="2824220" y="1419881"/>
-              <a:ext cx="150471" cy="150471"/>
-            </a:xfrm>
-            <a:prstGeom prst="ellipse">
-              <a:avLst/>
-            </a:prstGeom>
-            <a:solidFill>
-              <a:schemeClr val="accent6"/>
-            </a:solidFill>
-            <a:ln>
-              <a:noFill/>
-            </a:ln>
-            <a:effectLst/>
-          </p:spPr>
-          <p:style>
-            <a:lnRef idx="1">
-              <a:schemeClr val="accent1"/>
-            </a:lnRef>
-            <a:fillRef idx="3">
-              <a:schemeClr val="accent1"/>
-            </a:fillRef>
-            <a:effectRef idx="2">
-              <a:schemeClr val="accent1"/>
-            </a:effectRef>
-            <a:fontRef idx="minor">
-              <a:schemeClr val="lt1"/>
-            </a:fontRef>
-          </p:style>
-          <p:txBody>
-            <a:bodyPr rtlCol="0" anchor="t" anchorCtr="0"/>
-            <a:lstStyle/>
-            <a:p>
-              <a:pPr algn="l"/>
-              <a:endParaRPr lang="en-US" sz="1400" b="1" dirty="0">
-                <a:solidFill>
-                  <a:schemeClr val="tx1"/>
-                </a:solidFill>
-                <a:cs typeface="Georgia"/>
-              </a:endParaRPr>
-            </a:p>
-          </p:txBody>
-        </p:sp>
-        <p:sp>
-          <p:nvSpPr>
-            <p:cNvPr id="6" name="Oval 5">
-              <a:extLst>
-                <a:ext uri="{FF2B5EF4-FFF2-40B4-BE49-F238E27FC236}">
-                  <a16:creationId xmlns:a16="http://schemas.microsoft.com/office/drawing/2014/main" id="{FFF7843D-2229-65D8-04D5-DBED59553D1B}"/>
-                </a:ext>
-              </a:extLst>
-            </p:cNvPr>
-            <p:cNvSpPr/>
-            <p:nvPr/>
-          </p:nvSpPr>
-          <p:spPr>
-            <a:xfrm>
-              <a:off x="2976620" y="1572281"/>
-              <a:ext cx="150471" cy="150471"/>
-            </a:xfrm>
-            <a:prstGeom prst="ellipse">
-              <a:avLst/>
-            </a:prstGeom>
-            <a:solidFill>
-              <a:schemeClr val="accent6"/>
-            </a:solidFill>
-            <a:ln>
-              <a:noFill/>
-            </a:ln>
-            <a:effectLst/>
-          </p:spPr>
-          <p:style>
-            <a:lnRef idx="1">
-              <a:schemeClr val="accent1"/>
-            </a:lnRef>
-            <a:fillRef idx="3">
-              <a:schemeClr val="accent1"/>
-            </a:fillRef>
-            <a:effectRef idx="2">
-              <a:schemeClr val="accent1"/>
-            </a:effectRef>
-            <a:fontRef idx="minor">
-              <a:schemeClr val="lt1"/>
-            </a:fontRef>
-          </p:style>
-          <p:txBody>
-            <a:bodyPr rtlCol="0" anchor="t" anchorCtr="0"/>
-            <a:lstStyle/>
-            <a:p>
-              <a:pPr algn="l"/>
-              <a:endParaRPr lang="en-US" sz="1400" b="1" dirty="0">
-                <a:solidFill>
-                  <a:schemeClr val="tx1"/>
-                </a:solidFill>
-                <a:cs typeface="Georgia"/>
-              </a:endParaRPr>
-            </a:p>
-          </p:txBody>
-        </p:sp>
-        <p:sp>
-          <p:nvSpPr>
-            <p:cNvPr id="7" name="Oval 6">
-              <a:extLst>
-                <a:ext uri="{FF2B5EF4-FFF2-40B4-BE49-F238E27FC236}">
-                  <a16:creationId xmlns:a16="http://schemas.microsoft.com/office/drawing/2014/main" id="{81348B80-ECF7-1EB9-A8F0-ECEC9AB2DDF2}"/>
-                </a:ext>
-              </a:extLst>
-            </p:cNvPr>
-            <p:cNvSpPr/>
-            <p:nvPr/>
-          </p:nvSpPr>
-          <p:spPr>
-            <a:xfrm>
-              <a:off x="976132" y="1312379"/>
-              <a:ext cx="150471" cy="150471"/>
-            </a:xfrm>
-            <a:prstGeom prst="ellipse">
-              <a:avLst/>
-            </a:prstGeom>
-            <a:solidFill>
-              <a:schemeClr val="accent1"/>
-            </a:solidFill>
-            <a:ln>
-              <a:noFill/>
-            </a:ln>
-            <a:effectLst/>
-          </p:spPr>
-          <p:style>
-            <a:lnRef idx="1">
-              <a:schemeClr val="accent1"/>
-            </a:lnRef>
-            <a:fillRef idx="3">
-              <a:schemeClr val="accent1"/>
-            </a:fillRef>
-            <a:effectRef idx="2">
-              <a:schemeClr val="accent1"/>
-            </a:effectRef>
-            <a:fontRef idx="minor">
-              <a:schemeClr val="lt1"/>
-            </a:fontRef>
-          </p:style>
-          <p:txBody>
-            <a:bodyPr rtlCol="0" anchor="t" anchorCtr="0"/>
-            <a:lstStyle/>
-            <a:p>
-              <a:pPr algn="l"/>
-              <a:endParaRPr lang="en-US" sz="1400" b="1" dirty="0">
-                <a:solidFill>
-                  <a:schemeClr val="tx1"/>
-                </a:solidFill>
-                <a:cs typeface="Georgia"/>
-              </a:endParaRPr>
-            </a:p>
-          </p:txBody>
-        </p:sp>
-        <p:sp>
-          <p:nvSpPr>
-            <p:cNvPr id="8" name="Oval 7">
-              <a:extLst>
-                <a:ext uri="{FF2B5EF4-FFF2-40B4-BE49-F238E27FC236}">
-                  <a16:creationId xmlns:a16="http://schemas.microsoft.com/office/drawing/2014/main" id="{D8B0D86E-2C94-A534-5719-0064B8DCA78A}"/>
-                </a:ext>
-              </a:extLst>
-            </p:cNvPr>
-            <p:cNvSpPr/>
-            <p:nvPr/>
-          </p:nvSpPr>
-          <p:spPr>
-            <a:xfrm>
-              <a:off x="900896" y="3520685"/>
-              <a:ext cx="150471" cy="150471"/>
-            </a:xfrm>
-            <a:prstGeom prst="ellipse">
-              <a:avLst/>
-            </a:prstGeom>
-            <a:solidFill>
-              <a:schemeClr val="accent1"/>
-            </a:solidFill>
-            <a:ln>
-              <a:noFill/>
-            </a:ln>
-            <a:effectLst/>
-          </p:spPr>
-          <p:style>
-            <a:lnRef idx="1">
-              <a:schemeClr val="accent1"/>
-            </a:lnRef>
-            <a:fillRef idx="3">
-              <a:schemeClr val="accent1"/>
-            </a:fillRef>
-            <a:effectRef idx="2">
-              <a:schemeClr val="accent1"/>
-            </a:effectRef>
-            <a:fontRef idx="minor">
-              <a:schemeClr val="lt1"/>
-            </a:fontRef>
-          </p:style>
-          <p:txBody>
-            <a:bodyPr rtlCol="0" anchor="t" anchorCtr="0"/>
-            <a:lstStyle/>
-            <a:p>
-              <a:pPr algn="l"/>
-              <a:endParaRPr lang="en-US" sz="1400" b="1" dirty="0">
-                <a:solidFill>
-                  <a:schemeClr val="tx1"/>
-                </a:solidFill>
-                <a:cs typeface="Georgia"/>
-              </a:endParaRPr>
-            </a:p>
-          </p:txBody>
-        </p:sp>
-        <p:sp>
-          <p:nvSpPr>
-            <p:cNvPr id="9" name="Oval 8">
-              <a:extLst>
-                <a:ext uri="{FF2B5EF4-FFF2-40B4-BE49-F238E27FC236}">
-                  <a16:creationId xmlns:a16="http://schemas.microsoft.com/office/drawing/2014/main" id="{04612483-C754-3EE2-9B7E-BCC93AF462A2}"/>
-                </a:ext>
-              </a:extLst>
-            </p:cNvPr>
-            <p:cNvSpPr/>
-            <p:nvPr/>
-          </p:nvSpPr>
-          <p:spPr>
-            <a:xfrm>
-              <a:off x="3127091" y="3520685"/>
-              <a:ext cx="150471" cy="150471"/>
-            </a:xfrm>
-            <a:prstGeom prst="ellipse">
-              <a:avLst/>
-            </a:prstGeom>
-            <a:solidFill>
-              <a:schemeClr val="accent1"/>
-            </a:solidFill>
-            <a:ln>
-              <a:noFill/>
-            </a:ln>
-            <a:effectLst/>
-          </p:spPr>
-          <p:style>
-            <a:lnRef idx="1">
-              <a:schemeClr val="accent1"/>
-            </a:lnRef>
-            <a:fillRef idx="3">
-              <a:schemeClr val="accent1"/>
-            </a:fillRef>
-            <a:effectRef idx="2">
-              <a:schemeClr val="accent1"/>
-            </a:effectRef>
-            <a:fontRef idx="minor">
-              <a:schemeClr val="lt1"/>
-            </a:fontRef>
-          </p:style>
-          <p:txBody>
-            <a:bodyPr rtlCol="0" anchor="t" anchorCtr="0"/>
-            <a:lstStyle/>
-            <a:p>
-              <a:pPr algn="l"/>
-              <a:endParaRPr lang="en-US" sz="1400" b="1" dirty="0">
-                <a:solidFill>
-                  <a:schemeClr val="tx1"/>
-                </a:solidFill>
-                <a:cs typeface="Georgia"/>
-              </a:endParaRPr>
-            </a:p>
-          </p:txBody>
-        </p:sp>
-        <p:sp>
-          <p:nvSpPr>
-            <p:cNvPr id="12" name="TextBox 11">
-              <a:extLst>
-                <a:ext uri="{FF2B5EF4-FFF2-40B4-BE49-F238E27FC236}">
-                  <a16:creationId xmlns:a16="http://schemas.microsoft.com/office/drawing/2014/main" id="{F2CAD9D8-FDDD-8002-9D72-5DFA16771A34}"/>
-                </a:ext>
-              </a:extLst>
-            </p:cNvPr>
-            <p:cNvSpPr txBox="1"/>
-            <p:nvPr/>
-          </p:nvSpPr>
-          <p:spPr>
-            <a:xfrm>
-              <a:off x="2899455" y="1201020"/>
-              <a:ext cx="558166" cy="369332"/>
-            </a:xfrm>
-            <a:prstGeom prst="rect">
-              <a:avLst/>
-            </a:prstGeom>
-            <a:noFill/>
-          </p:spPr>
-          <p:txBody>
-            <a:bodyPr wrap="none" rtlCol="0">
-              <a:spAutoFit/>
-            </a:bodyPr>
-            <a:lstStyle/>
-            <a:p>
-              <a:r>
-                <a:rPr lang="en-US" dirty="0"/>
-                <a:t>Dog</a:t>
-              </a:r>
-            </a:p>
-          </p:txBody>
-        </p:sp>
-        <p:sp>
-          <p:nvSpPr>
-            <p:cNvPr id="13" name="TextBox 12">
-              <a:extLst>
-                <a:ext uri="{FF2B5EF4-FFF2-40B4-BE49-F238E27FC236}">
-                  <a16:creationId xmlns:a16="http://schemas.microsoft.com/office/drawing/2014/main" id="{C887A228-31F3-A995-6391-4D700236C2AF}"/>
-                </a:ext>
-              </a:extLst>
-            </p:cNvPr>
-            <p:cNvSpPr txBox="1"/>
-            <p:nvPr/>
-          </p:nvSpPr>
-          <p:spPr>
-            <a:xfrm>
-              <a:off x="3072726" y="1462850"/>
-              <a:ext cx="493533" cy="369332"/>
-            </a:xfrm>
-            <a:prstGeom prst="rect">
-              <a:avLst/>
-            </a:prstGeom>
-            <a:noFill/>
-          </p:spPr>
-          <p:txBody>
-            <a:bodyPr wrap="none" rtlCol="0">
-              <a:spAutoFit/>
-            </a:bodyPr>
-            <a:lstStyle/>
-            <a:p>
-              <a:r>
-                <a:rPr lang="en-US" dirty="0"/>
-                <a:t>Cat</a:t>
-              </a:r>
-            </a:p>
-          </p:txBody>
-        </p:sp>
-        <p:sp>
-          <p:nvSpPr>
-            <p:cNvPr id="16" name="TextBox 15">
-              <a:extLst>
-                <a:ext uri="{FF2B5EF4-FFF2-40B4-BE49-F238E27FC236}">
-                  <a16:creationId xmlns:a16="http://schemas.microsoft.com/office/drawing/2014/main" id="{01114295-92F0-6CDB-25AC-B03640017D07}"/>
-                </a:ext>
-              </a:extLst>
-            </p:cNvPr>
-            <p:cNvSpPr txBox="1"/>
-            <p:nvPr/>
-          </p:nvSpPr>
-          <p:spPr>
-            <a:xfrm>
-              <a:off x="1670563" y="3877137"/>
-              <a:ext cx="953081" cy="369332"/>
-            </a:xfrm>
-            <a:prstGeom prst="rect">
-              <a:avLst/>
-            </a:prstGeom>
-            <a:noFill/>
-          </p:spPr>
-          <p:txBody>
-            <a:bodyPr wrap="none" rtlCol="0">
-              <a:spAutoFit/>
-            </a:bodyPr>
-            <a:lstStyle/>
-            <a:p>
-              <a:r>
-                <a:rPr lang="en-US" dirty="0"/>
-                <a:t>Lactates</a:t>
-              </a:r>
-            </a:p>
-          </p:txBody>
-        </p:sp>
-        <p:sp>
-          <p:nvSpPr>
-            <p:cNvPr id="17" name="TextBox 16">
-              <a:extLst>
-                <a:ext uri="{FF2B5EF4-FFF2-40B4-BE49-F238E27FC236}">
-                  <a16:creationId xmlns:a16="http://schemas.microsoft.com/office/drawing/2014/main" id="{90A3BD21-6E8F-C237-1F4D-5100C3F20EDC}"/>
-                </a:ext>
-              </a:extLst>
-            </p:cNvPr>
-            <p:cNvSpPr txBox="1"/>
-            <p:nvPr/>
-          </p:nvSpPr>
-          <p:spPr>
-            <a:xfrm rot="16200000">
-              <a:off x="-28672" y="2324867"/>
-              <a:ext cx="1037335" cy="369332"/>
-            </a:xfrm>
-            <a:prstGeom prst="rect">
-              <a:avLst/>
-            </a:prstGeom>
-            <a:noFill/>
-          </p:spPr>
-          <p:txBody>
-            <a:bodyPr wrap="none" rtlCol="0">
-              <a:spAutoFit/>
-            </a:bodyPr>
-            <a:lstStyle/>
-            <a:p>
-              <a:r>
-                <a:rPr lang="en-US" dirty="0"/>
-                <a:t>Placental</a:t>
-              </a:r>
-            </a:p>
-          </p:txBody>
-        </p:sp>
-        <p:sp>
-          <p:nvSpPr>
-            <p:cNvPr id="18" name="TextBox 17">
-              <a:extLst>
-                <a:ext uri="{FF2B5EF4-FFF2-40B4-BE49-F238E27FC236}">
-                  <a16:creationId xmlns:a16="http://schemas.microsoft.com/office/drawing/2014/main" id="{11AA189B-2738-6135-E235-CE955E94CFC9}"/>
-                </a:ext>
-              </a:extLst>
-            </p:cNvPr>
-            <p:cNvSpPr txBox="1"/>
-            <p:nvPr/>
-          </p:nvSpPr>
-          <p:spPr>
-            <a:xfrm>
-              <a:off x="990755" y="3411254"/>
-              <a:ext cx="732316" cy="369332"/>
-            </a:xfrm>
-            <a:prstGeom prst="rect">
-              <a:avLst/>
-            </a:prstGeom>
-            <a:noFill/>
-          </p:spPr>
-          <p:txBody>
-            <a:bodyPr wrap="none" rtlCol="0">
-              <a:spAutoFit/>
-            </a:bodyPr>
-            <a:lstStyle/>
-            <a:p>
-              <a:r>
-                <a:rPr lang="en-US" dirty="0"/>
-                <a:t>Lizard</a:t>
-              </a:r>
-            </a:p>
-          </p:txBody>
-        </p:sp>
-        <p:sp>
-          <p:nvSpPr>
-            <p:cNvPr id="19" name="TextBox 18">
-              <a:extLst>
-                <a:ext uri="{FF2B5EF4-FFF2-40B4-BE49-F238E27FC236}">
-                  <a16:creationId xmlns:a16="http://schemas.microsoft.com/office/drawing/2014/main" id="{0129C2B0-02EC-5399-AE6F-2DE4F55F475E}"/>
-                </a:ext>
-              </a:extLst>
-            </p:cNvPr>
-            <p:cNvSpPr txBox="1"/>
-            <p:nvPr/>
-          </p:nvSpPr>
-          <p:spPr>
-            <a:xfrm>
-              <a:off x="876938" y="1402610"/>
-              <a:ext cx="1096775" cy="369332"/>
-            </a:xfrm>
-            <a:prstGeom prst="rect">
-              <a:avLst/>
-            </a:prstGeom>
-            <a:noFill/>
-          </p:spPr>
-          <p:txBody>
-            <a:bodyPr wrap="none" rtlCol="0">
-              <a:spAutoFit/>
-            </a:bodyPr>
-            <a:lstStyle/>
-            <a:p>
-              <a:r>
-                <a:rPr lang="en-US" dirty="0"/>
-                <a:t>Bull shark</a:t>
-              </a:r>
-            </a:p>
-          </p:txBody>
-        </p:sp>
-        <p:sp>
-          <p:nvSpPr>
-            <p:cNvPr id="20" name="TextBox 19">
-              <a:extLst>
-                <a:ext uri="{FF2B5EF4-FFF2-40B4-BE49-F238E27FC236}">
-                  <a16:creationId xmlns:a16="http://schemas.microsoft.com/office/drawing/2014/main" id="{F75B40BA-EACD-76EF-06D2-D586D4945E8E}"/>
-                </a:ext>
-              </a:extLst>
-            </p:cNvPr>
-            <p:cNvSpPr txBox="1"/>
-            <p:nvPr/>
-          </p:nvSpPr>
-          <p:spPr>
-            <a:xfrm>
-              <a:off x="2623644" y="3166095"/>
-              <a:ext cx="822341" cy="369332"/>
-            </a:xfrm>
-            <a:prstGeom prst="rect">
-              <a:avLst/>
-            </a:prstGeom>
-            <a:noFill/>
-          </p:spPr>
-          <p:txBody>
-            <a:bodyPr wrap="none" rtlCol="0">
-              <a:spAutoFit/>
-            </a:bodyPr>
-            <a:lstStyle/>
-            <a:p>
-              <a:r>
-                <a:rPr lang="en-US" dirty="0"/>
-                <a:t>Pigeon</a:t>
-              </a:r>
-            </a:p>
-          </p:txBody>
-        </p:sp>
-        <p:sp>
-          <p:nvSpPr>
-            <p:cNvPr id="21" name="TextBox 20">
-              <a:extLst>
-                <a:ext uri="{FF2B5EF4-FFF2-40B4-BE49-F238E27FC236}">
-                  <a16:creationId xmlns:a16="http://schemas.microsoft.com/office/drawing/2014/main" id="{E7593DE6-77E7-6A18-BC61-7295B00F45DA}"/>
-                </a:ext>
-              </a:extLst>
-            </p:cNvPr>
-            <p:cNvSpPr txBox="1"/>
-            <p:nvPr/>
-          </p:nvSpPr>
-          <p:spPr>
-            <a:xfrm>
-              <a:off x="534104" y="3780586"/>
-              <a:ext cx="301686" cy="369332"/>
-            </a:xfrm>
-            <a:prstGeom prst="rect">
-              <a:avLst/>
-            </a:prstGeom>
-            <a:noFill/>
-          </p:spPr>
-          <p:txBody>
-            <a:bodyPr wrap="none" rtlCol="0">
-              <a:spAutoFit/>
-            </a:bodyPr>
-            <a:lstStyle/>
-            <a:p>
-              <a:r>
-                <a:rPr lang="en-US" dirty="0"/>
-                <a:t>0</a:t>
-              </a:r>
-            </a:p>
-          </p:txBody>
-        </p:sp>
-        <p:sp>
-          <p:nvSpPr>
-            <p:cNvPr id="22" name="TextBox 21">
-              <a:extLst>
-                <a:ext uri="{FF2B5EF4-FFF2-40B4-BE49-F238E27FC236}">
-                  <a16:creationId xmlns:a16="http://schemas.microsoft.com/office/drawing/2014/main" id="{BFE03B20-8AE0-78BB-9B79-AE5803D9DEA3}"/>
-                </a:ext>
-              </a:extLst>
-            </p:cNvPr>
-            <p:cNvSpPr txBox="1"/>
-            <p:nvPr/>
-          </p:nvSpPr>
-          <p:spPr>
-            <a:xfrm>
-              <a:off x="3285794" y="3815576"/>
-              <a:ext cx="301686" cy="369332"/>
-            </a:xfrm>
-            <a:prstGeom prst="rect">
-              <a:avLst/>
-            </a:prstGeom>
-            <a:noFill/>
-          </p:spPr>
-          <p:txBody>
-            <a:bodyPr wrap="none" rtlCol="0">
-              <a:spAutoFit/>
-            </a:bodyPr>
-            <a:lstStyle/>
-            <a:p>
-              <a:r>
-                <a:rPr lang="en-US" dirty="0"/>
-                <a:t>1</a:t>
-              </a:r>
-            </a:p>
-          </p:txBody>
-        </p:sp>
-        <p:sp>
-          <p:nvSpPr>
-            <p:cNvPr id="23" name="TextBox 22">
-              <a:extLst>
-                <a:ext uri="{FF2B5EF4-FFF2-40B4-BE49-F238E27FC236}">
-                  <a16:creationId xmlns:a16="http://schemas.microsoft.com/office/drawing/2014/main" id="{41D6D2FA-CD3A-CF1E-AFB4-E1335A6450D6}"/>
-                </a:ext>
-              </a:extLst>
-            </p:cNvPr>
-            <p:cNvSpPr txBox="1"/>
-            <p:nvPr/>
-          </p:nvSpPr>
-          <p:spPr>
-            <a:xfrm>
-              <a:off x="412735" y="1050549"/>
-              <a:ext cx="301686" cy="369332"/>
-            </a:xfrm>
-            <a:prstGeom prst="rect">
-              <a:avLst/>
-            </a:prstGeom>
-            <a:noFill/>
-          </p:spPr>
-          <p:txBody>
-            <a:bodyPr wrap="none" rtlCol="0">
-              <a:spAutoFit/>
-            </a:bodyPr>
-            <a:lstStyle/>
-            <a:p>
-              <a:r>
-                <a:rPr lang="en-US" dirty="0"/>
-                <a:t>1</a:t>
-              </a:r>
-            </a:p>
-          </p:txBody>
-        </p:sp>
-        <p:cxnSp>
-          <p:nvCxnSpPr>
-            <p:cNvPr id="25" name="Straight Connector 24">
-              <a:extLst>
-                <a:ext uri="{FF2B5EF4-FFF2-40B4-BE49-F238E27FC236}">
-                  <a16:creationId xmlns:a16="http://schemas.microsoft.com/office/drawing/2014/main" id="{0EA46C8C-5F94-87B7-37A5-A2C615553738}"/>
-                </a:ext>
-              </a:extLst>
-            </p:cNvPr>
-            <p:cNvCxnSpPr>
-              <a:cxnSpLocks/>
-            </p:cNvCxnSpPr>
-            <p:nvPr/>
-          </p:nvCxnSpPr>
-          <p:spPr>
-            <a:xfrm>
-              <a:off x="1624263" y="985050"/>
-              <a:ext cx="2068967" cy="2321501"/>
-            </a:xfrm>
-            <a:prstGeom prst="line">
-              <a:avLst/>
-            </a:prstGeom>
-            <a:ln>
-              <a:prstDash val="dash"/>
-            </a:ln>
-          </p:spPr>
-          <p:style>
-            <a:lnRef idx="2">
-              <a:schemeClr val="accent1"/>
-            </a:lnRef>
-            <a:fillRef idx="0">
-              <a:schemeClr val="accent1"/>
-            </a:fillRef>
-            <a:effectRef idx="1">
-              <a:schemeClr val="accent1"/>
-            </a:effectRef>
-            <a:fontRef idx="minor">
-              <a:schemeClr val="tx1"/>
-            </a:fontRef>
-          </p:style>
-        </p:cxnSp>
       </p:grpSp>
-      <p:sp>
-        <p:nvSpPr>
-          <p:cNvPr id="32" name="Freeform 31">
-            <a:extLst>
-              <a:ext uri="{FF2B5EF4-FFF2-40B4-BE49-F238E27FC236}">
-                <a16:creationId xmlns:a16="http://schemas.microsoft.com/office/drawing/2014/main" id="{E01FFCB4-2ADB-E576-5807-73C1CC3DA7AA}"/>
-              </a:ext>
-            </a:extLst>
-          </p:cNvPr>
-          <p:cNvSpPr/>
-          <p:nvPr/>
-        </p:nvSpPr>
-        <p:spPr>
-          <a:xfrm>
-            <a:off x="5268667" y="1195665"/>
-            <a:ext cx="3946967" cy="2789499"/>
-          </a:xfrm>
-          <a:custGeom>
-            <a:avLst/>
-            <a:gdLst>
-              <a:gd name="connsiteX0" fmla="*/ 0 w 3946967"/>
-              <a:gd name="connsiteY0" fmla="*/ 2789499 h 2789499"/>
-              <a:gd name="connsiteX1" fmla="*/ 1689903 w 3946967"/>
-              <a:gd name="connsiteY1" fmla="*/ 1122744 h 2789499"/>
-              <a:gd name="connsiteX2" fmla="*/ 2558005 w 3946967"/>
-              <a:gd name="connsiteY2" fmla="*/ 1689904 h 2789499"/>
-              <a:gd name="connsiteX3" fmla="*/ 3946967 w 3946967"/>
-              <a:gd name="connsiteY3" fmla="*/ 0 h 2789499"/>
-              <a:gd name="connsiteX4" fmla="*/ 3946967 w 3946967"/>
-              <a:gd name="connsiteY4" fmla="*/ 0 h 2789499"/>
-            </a:gdLst>
-            <a:ahLst/>
-            <a:cxnLst>
-              <a:cxn ang="0">
-                <a:pos x="connsiteX0" y="connsiteY0"/>
-              </a:cxn>
-              <a:cxn ang="0">
-                <a:pos x="connsiteX1" y="connsiteY1"/>
-              </a:cxn>
-              <a:cxn ang="0">
-                <a:pos x="connsiteX2" y="connsiteY2"/>
-              </a:cxn>
-              <a:cxn ang="0">
-                <a:pos x="connsiteX3" y="connsiteY3"/>
-              </a:cxn>
-              <a:cxn ang="0">
-                <a:pos x="connsiteX4" y="connsiteY4"/>
-              </a:cxn>
-            </a:cxnLst>
-            <a:rect l="l" t="t" r="r" b="b"/>
-            <a:pathLst>
-              <a:path w="3946967" h="2789499">
-                <a:moveTo>
-                  <a:pt x="0" y="2789499"/>
-                </a:moveTo>
-                <a:cubicBezTo>
-                  <a:pt x="631784" y="2047754"/>
-                  <a:pt x="1263569" y="1306010"/>
-                  <a:pt x="1689903" y="1122744"/>
-                </a:cubicBezTo>
-                <a:cubicBezTo>
-                  <a:pt x="2116237" y="939478"/>
-                  <a:pt x="2181828" y="1877028"/>
-                  <a:pt x="2558005" y="1689904"/>
-                </a:cubicBezTo>
-                <a:cubicBezTo>
-                  <a:pt x="2934182" y="1502780"/>
-                  <a:pt x="3946967" y="0"/>
-                  <a:pt x="3946967" y="0"/>
-                </a:cubicBezTo>
-                <a:lnTo>
-                  <a:pt x="3946967" y="0"/>
-                </a:lnTo>
-              </a:path>
-            </a:pathLst>
-          </a:custGeom>
-          <a:noFill/>
-          <a:ln w="19050">
-            <a:solidFill>
-              <a:schemeClr val="accent1"/>
-            </a:solidFill>
-            <a:prstDash val="dash"/>
-          </a:ln>
-          <a:effectLst/>
-        </p:spPr>
-        <p:style>
-          <a:lnRef idx="1">
-            <a:schemeClr val="accent1"/>
-          </a:lnRef>
-          <a:fillRef idx="3">
-            <a:schemeClr val="accent1"/>
-          </a:fillRef>
-          <a:effectRef idx="2">
-            <a:schemeClr val="accent1"/>
-          </a:effectRef>
-          <a:fontRef idx="minor">
-            <a:schemeClr val="lt1"/>
-          </a:fontRef>
-        </p:style>
-        <p:txBody>
-          <a:bodyPr rtlCol="0" anchor="ctr"/>
-          <a:lstStyle/>
-          <a:p>
-            <a:pPr algn="ctr"/>
-            <a:endParaRPr lang="en-US"/>
-          </a:p>
-        </p:txBody>
-      </p:sp>
       <p:grpSp>
         <p:nvGrpSpPr>
           <p:cNvPr id="1034" name="Group 1033">
@@ -14188,7 +13461,7 @@
         </p:nvGrpSpPr>
         <p:grpSpPr>
           <a:xfrm>
-            <a:off x="7984892" y="4825477"/>
+            <a:off x="6623925" y="1522526"/>
             <a:ext cx="1804507" cy="1852523"/>
             <a:chOff x="2243138" y="4917276"/>
             <a:chExt cx="1804507" cy="1852523"/>
@@ -15150,7 +14423,7 @@
         </p:nvSpPr>
         <p:spPr>
           <a:xfrm>
-            <a:off x="4894450" y="5053943"/>
+            <a:off x="6587519" y="3773408"/>
             <a:ext cx="2920814" cy="830997"/>
           </a:xfrm>
           <a:prstGeom prst="rect">
@@ -15188,221 +14461,6 @@
 </file>
 
 <file path=ppt/slides/slide6.xml><?xml version="1.0" encoding="utf-8"?>
-<p:sld xmlns:a="http://schemas.openxmlformats.org/drawingml/2006/main" xmlns:r="http://schemas.openxmlformats.org/officeDocument/2006/relationships" xmlns:p="http://schemas.openxmlformats.org/presentationml/2006/main">
-  <p:cSld>
-    <p:spTree>
-      <p:nvGrpSpPr>
-        <p:cNvPr id="1" name=""/>
-        <p:cNvGrpSpPr/>
-        <p:nvPr/>
-      </p:nvGrpSpPr>
-      <p:grpSpPr>
-        <a:xfrm>
-          <a:off x="0" y="0"/>
-          <a:ext cx="0" cy="0"/>
-          <a:chOff x="0" y="0"/>
-          <a:chExt cx="0" cy="0"/>
-        </a:xfrm>
-      </p:grpSpPr>
-      <p:sp>
-        <p:nvSpPr>
-          <p:cNvPr id="2" name="Title 1">
-            <a:extLst>
-              <a:ext uri="{FF2B5EF4-FFF2-40B4-BE49-F238E27FC236}">
-                <a16:creationId xmlns:a16="http://schemas.microsoft.com/office/drawing/2014/main" id="{3F5EC8B7-0D30-4F89-32A2-973C1CFE51EA}"/>
-              </a:ext>
-            </a:extLst>
-          </p:cNvPr>
-          <p:cNvSpPr>
-            <a:spLocks noGrp="1"/>
-          </p:cNvSpPr>
-          <p:nvPr>
-            <p:ph type="title"/>
-          </p:nvPr>
-        </p:nvSpPr>
-        <p:spPr/>
-        <p:txBody>
-          <a:bodyPr/>
-          <a:lstStyle/>
-          <a:p>
-            <a:r>
-              <a:rPr lang="en-US" dirty="0"/>
-              <a:t>More complex problems: hidden layers</a:t>
-            </a:r>
-          </a:p>
-        </p:txBody>
-      </p:sp>
-      <p:pic>
-        <p:nvPicPr>
-          <p:cNvPr id="4" name="Picture 3">
-            <a:extLst>
-              <a:ext uri="{FF2B5EF4-FFF2-40B4-BE49-F238E27FC236}">
-                <a16:creationId xmlns:a16="http://schemas.microsoft.com/office/drawing/2014/main" id="{D7FD0B39-AC7B-FA08-10C0-E597741499EB}"/>
-              </a:ext>
-            </a:extLst>
-          </p:cNvPr>
-          <p:cNvPicPr>
-            <a:picLocks noChangeAspect="1"/>
-          </p:cNvPicPr>
-          <p:nvPr/>
-        </p:nvPicPr>
-        <p:blipFill>
-          <a:blip r:embed="rId2"/>
-          <a:stretch>
-            <a:fillRect/>
-          </a:stretch>
-        </p:blipFill>
-        <p:spPr>
-          <a:xfrm>
-            <a:off x="4375418" y="1365813"/>
-            <a:ext cx="7370816" cy="4363654"/>
-          </a:xfrm>
-          <a:prstGeom prst="rect">
-            <a:avLst/>
-          </a:prstGeom>
-        </p:spPr>
-      </p:pic>
-      <p:pic>
-        <p:nvPicPr>
-          <p:cNvPr id="5" name="Picture 4">
-            <a:extLst>
-              <a:ext uri="{FF2B5EF4-FFF2-40B4-BE49-F238E27FC236}">
-                <a16:creationId xmlns:a16="http://schemas.microsoft.com/office/drawing/2014/main" id="{856EA611-60ED-3292-E592-50B0067A66C8}"/>
-              </a:ext>
-            </a:extLst>
-          </p:cNvPr>
-          <p:cNvPicPr>
-            <a:picLocks noChangeAspect="1"/>
-          </p:cNvPicPr>
-          <p:nvPr/>
-        </p:nvPicPr>
-        <p:blipFill rotWithShape="1">
-          <a:blip r:embed="rId3"/>
-          <a:srcRect t="17582" r="53226" b="44326"/>
-          <a:stretch/>
-        </p:blipFill>
-        <p:spPr>
-          <a:xfrm>
-            <a:off x="480000" y="1365813"/>
-            <a:ext cx="3635415" cy="2233914"/>
-          </a:xfrm>
-          <a:prstGeom prst="rect">
-            <a:avLst/>
-          </a:prstGeom>
-        </p:spPr>
-      </p:pic>
-      <p:sp>
-        <p:nvSpPr>
-          <p:cNvPr id="6" name="TextBox 5">
-            <a:extLst>
-              <a:ext uri="{FF2B5EF4-FFF2-40B4-BE49-F238E27FC236}">
-                <a16:creationId xmlns:a16="http://schemas.microsoft.com/office/drawing/2014/main" id="{535A9CE7-2172-5EBD-33B3-BF5F579024D4}"/>
-              </a:ext>
-            </a:extLst>
-          </p:cNvPr>
-          <p:cNvSpPr txBox="1"/>
-          <p:nvPr/>
-        </p:nvSpPr>
-        <p:spPr>
-          <a:xfrm>
-            <a:off x="4375418" y="5825948"/>
-            <a:ext cx="3733907" cy="369332"/>
-          </a:xfrm>
-          <a:prstGeom prst="rect">
-            <a:avLst/>
-          </a:prstGeom>
-          <a:noFill/>
-        </p:spPr>
-        <p:txBody>
-          <a:bodyPr wrap="none" rtlCol="0">
-            <a:spAutoFit/>
-          </a:bodyPr>
-          <a:lstStyle/>
-          <a:p>
-            <a:r>
-              <a:rPr lang="en-GB" dirty="0"/>
-              <a:t>Credit: Huang &amp; Lippmann, NIPS 1988</a:t>
-            </a:r>
-            <a:endParaRPr lang="en-US" dirty="0"/>
-          </a:p>
-        </p:txBody>
-      </p:sp>
-      <p:sp>
-        <p:nvSpPr>
-          <p:cNvPr id="7" name="TextBox 6">
-            <a:extLst>
-              <a:ext uri="{FF2B5EF4-FFF2-40B4-BE49-F238E27FC236}">
-                <a16:creationId xmlns:a16="http://schemas.microsoft.com/office/drawing/2014/main" id="{1988725D-EA3A-9426-3146-4EA0FF9C8619}"/>
-              </a:ext>
-            </a:extLst>
-          </p:cNvPr>
-          <p:cNvSpPr txBox="1"/>
-          <p:nvPr/>
-        </p:nvSpPr>
-        <p:spPr>
-          <a:xfrm>
-            <a:off x="438699" y="4291858"/>
-            <a:ext cx="3936719" cy="1200329"/>
-          </a:xfrm>
-          <a:prstGeom prst="rect">
-            <a:avLst/>
-          </a:prstGeom>
-          <a:noFill/>
-        </p:spPr>
-        <p:txBody>
-          <a:bodyPr wrap="none" rtlCol="0">
-            <a:spAutoFit/>
-          </a:bodyPr>
-          <a:lstStyle/>
-          <a:p>
-            <a:pPr marL="285750" indent="-285750">
-              <a:buFont typeface="Arial" panose="020B0604020202020204" pitchFamily="34" charset="0"/>
-              <a:buChar char="•"/>
-            </a:pPr>
-            <a:r>
-              <a:rPr lang="en-US" sz="2400" dirty="0"/>
-              <a:t>Two layers</a:t>
-            </a:r>
-          </a:p>
-          <a:p>
-            <a:pPr marL="285750" indent="-285750">
-              <a:buFont typeface="Arial" panose="020B0604020202020204" pitchFamily="34" charset="0"/>
-              <a:buChar char="•"/>
-            </a:pPr>
-            <a:r>
-              <a:rPr lang="en-US" sz="2400" dirty="0"/>
-              <a:t>100 nodes</a:t>
-            </a:r>
-          </a:p>
-          <a:p>
-            <a:pPr marL="285750" indent="-285750">
-              <a:buFont typeface="Arial" panose="020B0604020202020204" pitchFamily="34" charset="0"/>
-              <a:buChar char="•"/>
-            </a:pPr>
-            <a:r>
-              <a:rPr lang="en-US" sz="2400" dirty="0"/>
-              <a:t>1200 parameters (estimate)</a:t>
-            </a:r>
-          </a:p>
-        </p:txBody>
-      </p:sp>
-    </p:spTree>
-    <p:extLst>
-      <p:ext uri="{BB962C8B-B14F-4D97-AF65-F5344CB8AC3E}">
-        <p14:creationId xmlns:p14="http://schemas.microsoft.com/office/powerpoint/2010/main" val="621660303"/>
-      </p:ext>
-    </p:extLst>
-  </p:cSld>
-  <p:clrMapOvr>
-    <a:masterClrMapping/>
-  </p:clrMapOvr>
-  <p:transition>
-    <p:fade/>
-  </p:transition>
-</p:sld>
-</file>
-
-<file path=ppt/slides/slide7.xml><?xml version="1.0" encoding="utf-8"?>
 <p:sld xmlns:a="http://schemas.openxmlformats.org/drawingml/2006/main" xmlns:r="http://schemas.openxmlformats.org/officeDocument/2006/relationships" xmlns:p="http://schemas.openxmlformats.org/presentationml/2006/main">
   <p:cSld>
     <p:spTree>
@@ -15650,6 +14708,266 @@
     <p:extLst>
       <p:ext uri="{BB962C8B-B14F-4D97-AF65-F5344CB8AC3E}">
         <p14:creationId xmlns:p14="http://schemas.microsoft.com/office/powerpoint/2010/main" val="852689521"/>
+      </p:ext>
+    </p:extLst>
+  </p:cSld>
+  <p:clrMapOvr>
+    <a:masterClrMapping/>
+  </p:clrMapOvr>
+  <p:transition>
+    <p:fade/>
+  </p:transition>
+</p:sld>
+</file>
+
+<file path=ppt/slides/slide7.xml><?xml version="1.0" encoding="utf-8"?>
+<p:sld xmlns:a="http://schemas.openxmlformats.org/drawingml/2006/main" xmlns:r="http://schemas.openxmlformats.org/officeDocument/2006/relationships" xmlns:p="http://schemas.openxmlformats.org/presentationml/2006/main">
+  <p:cSld>
+    <p:spTree>
+      <p:nvGrpSpPr>
+        <p:cNvPr id="1" name=""/>
+        <p:cNvGrpSpPr/>
+        <p:nvPr/>
+      </p:nvGrpSpPr>
+      <p:grpSpPr>
+        <a:xfrm>
+          <a:off x="0" y="0"/>
+          <a:ext cx="0" cy="0"/>
+          <a:chOff x="0" y="0"/>
+          <a:chExt cx="0" cy="0"/>
+        </a:xfrm>
+      </p:grpSpPr>
+      <p:sp>
+        <p:nvSpPr>
+          <p:cNvPr id="2" name="Title 1">
+            <a:extLst>
+              <a:ext uri="{FF2B5EF4-FFF2-40B4-BE49-F238E27FC236}">
+                <a16:creationId xmlns:a16="http://schemas.microsoft.com/office/drawing/2014/main" id="{A2CB30E3-9FC0-7298-9CE3-766CF3E35BE2}"/>
+              </a:ext>
+            </a:extLst>
+          </p:cNvPr>
+          <p:cNvSpPr>
+            <a:spLocks noGrp="1"/>
+          </p:cNvSpPr>
+          <p:nvPr>
+            <p:ph type="title"/>
+          </p:nvPr>
+        </p:nvSpPr>
+        <p:spPr/>
+        <p:txBody>
+          <a:bodyPr/>
+          <a:lstStyle/>
+          <a:p>
+            <a:r>
+              <a:rPr lang="en-US" dirty="0"/>
+              <a:t>How do we model language in a neural network?</a:t>
+            </a:r>
+          </a:p>
+        </p:txBody>
+      </p:sp>
+      <p:pic>
+        <p:nvPicPr>
+          <p:cNvPr id="4" name="Picture 3">
+            <a:extLst>
+              <a:ext uri="{FF2B5EF4-FFF2-40B4-BE49-F238E27FC236}">
+                <a16:creationId xmlns:a16="http://schemas.microsoft.com/office/drawing/2014/main" id="{D5FB7D02-A4DC-57C2-8123-8B88E4ED58C6}"/>
+              </a:ext>
+            </a:extLst>
+          </p:cNvPr>
+          <p:cNvPicPr>
+            <a:picLocks noChangeAspect="1"/>
+          </p:cNvPicPr>
+          <p:nvPr/>
+        </p:nvPicPr>
+        <p:blipFill>
+          <a:blip r:embed="rId2"/>
+          <a:stretch>
+            <a:fillRect/>
+          </a:stretch>
+        </p:blipFill>
+        <p:spPr>
+          <a:xfrm>
+            <a:off x="990600" y="1534092"/>
+            <a:ext cx="9588500" cy="4991274"/>
+          </a:xfrm>
+          <a:prstGeom prst="rect">
+            <a:avLst/>
+          </a:prstGeom>
+        </p:spPr>
+      </p:pic>
+      <p:sp>
+        <p:nvSpPr>
+          <p:cNvPr id="5" name="TextBox 4">
+            <a:extLst>
+              <a:ext uri="{FF2B5EF4-FFF2-40B4-BE49-F238E27FC236}">
+                <a16:creationId xmlns:a16="http://schemas.microsoft.com/office/drawing/2014/main" id="{4DD286EE-A365-0C5E-A1F2-E2F504D03498}"/>
+              </a:ext>
+            </a:extLst>
+          </p:cNvPr>
+          <p:cNvSpPr txBox="1"/>
+          <p:nvPr/>
+        </p:nvSpPr>
+        <p:spPr>
+          <a:xfrm>
+            <a:off x="8643018" y="6493334"/>
+            <a:ext cx="3068982" cy="369332"/>
+          </a:xfrm>
+          <a:prstGeom prst="rect">
+            <a:avLst/>
+          </a:prstGeom>
+          <a:noFill/>
+        </p:spPr>
+        <p:txBody>
+          <a:bodyPr wrap="none" rtlCol="0">
+            <a:spAutoFit/>
+          </a:bodyPr>
+          <a:lstStyle/>
+          <a:p>
+            <a:r>
+              <a:rPr lang="en-US" dirty="0"/>
+              <a:t>(</a:t>
+            </a:r>
+            <a:r>
+              <a:rPr lang="en-US" dirty="0" err="1"/>
+              <a:t>Jurafsky</a:t>
+            </a:r>
+            <a:r>
+              <a:rPr lang="en-US" dirty="0"/>
+              <a:t> and Martin, Fig. 7.11)</a:t>
+            </a:r>
+          </a:p>
+        </p:txBody>
+      </p:sp>
+      <p:sp>
+        <p:nvSpPr>
+          <p:cNvPr id="6" name="Rounded Rectangle 5">
+            <a:extLst>
+              <a:ext uri="{FF2B5EF4-FFF2-40B4-BE49-F238E27FC236}">
+                <a16:creationId xmlns:a16="http://schemas.microsoft.com/office/drawing/2014/main" id="{22DFFEFB-0F9D-1801-94BC-04BBBB956226}"/>
+              </a:ext>
+            </a:extLst>
+          </p:cNvPr>
+          <p:cNvSpPr/>
+          <p:nvPr/>
+        </p:nvSpPr>
+        <p:spPr>
+          <a:xfrm>
+            <a:off x="167222" y="709766"/>
+            <a:ext cx="2791877" cy="1326559"/>
+          </a:xfrm>
+          <a:prstGeom prst="roundRect">
+            <a:avLst/>
+          </a:prstGeom>
+          <a:solidFill>
+            <a:schemeClr val="accent6">
+              <a:lumMod val="20000"/>
+              <a:lumOff val="80000"/>
+            </a:schemeClr>
+          </a:solidFill>
+          <a:ln w="12700">
+            <a:solidFill>
+              <a:schemeClr val="tx1"/>
+            </a:solidFill>
+          </a:ln>
+        </p:spPr>
+        <p:style>
+          <a:lnRef idx="2">
+            <a:schemeClr val="accent1">
+              <a:shade val="50000"/>
+            </a:schemeClr>
+          </a:lnRef>
+          <a:fillRef idx="1">
+            <a:schemeClr val="accent1"/>
+          </a:fillRef>
+          <a:effectRef idx="0">
+            <a:schemeClr val="accent1"/>
+          </a:effectRef>
+          <a:fontRef idx="minor">
+            <a:schemeClr val="lt1"/>
+          </a:fontRef>
+        </p:style>
+        <p:txBody>
+          <a:bodyPr rtlCol="0" anchor="ctr"/>
+          <a:lstStyle/>
+          <a:p>
+            <a:r>
+              <a:rPr lang="en-US" sz="1600" dirty="0">
+                <a:solidFill>
+                  <a:schemeClr val="tx1"/>
+                </a:solidFill>
+              </a:rPr>
+              <a:t>Replace the words with embeddings. The model will be more general, rather than focused on specific words from the training data.</a:t>
+            </a:r>
+          </a:p>
+        </p:txBody>
+      </p:sp>
+      <p:sp>
+        <p:nvSpPr>
+          <p:cNvPr id="3" name="Rounded Rectangle 2">
+            <a:extLst>
+              <a:ext uri="{FF2B5EF4-FFF2-40B4-BE49-F238E27FC236}">
+                <a16:creationId xmlns:a16="http://schemas.microsoft.com/office/drawing/2014/main" id="{F936364B-1895-1F75-D65A-E8558DAA3E9B}"/>
+              </a:ext>
+            </a:extLst>
+          </p:cNvPr>
+          <p:cNvSpPr/>
+          <p:nvPr/>
+        </p:nvSpPr>
+        <p:spPr>
+          <a:xfrm>
+            <a:off x="9613310" y="4121821"/>
+            <a:ext cx="2283877" cy="778773"/>
+          </a:xfrm>
+          <a:prstGeom prst="roundRect">
+            <a:avLst/>
+          </a:prstGeom>
+          <a:solidFill>
+            <a:schemeClr val="accent6">
+              <a:lumMod val="20000"/>
+              <a:lumOff val="80000"/>
+            </a:schemeClr>
+          </a:solidFill>
+          <a:ln w="12700">
+            <a:solidFill>
+              <a:schemeClr val="tx1"/>
+            </a:solidFill>
+          </a:ln>
+        </p:spPr>
+        <p:style>
+          <a:lnRef idx="2">
+            <a:schemeClr val="accent1">
+              <a:shade val="50000"/>
+            </a:schemeClr>
+          </a:lnRef>
+          <a:fillRef idx="1">
+            <a:schemeClr val="accent1"/>
+          </a:fillRef>
+          <a:effectRef idx="0">
+            <a:schemeClr val="accent1"/>
+          </a:effectRef>
+          <a:fontRef idx="minor">
+            <a:schemeClr val="lt1"/>
+          </a:fontRef>
+        </p:style>
+        <p:txBody>
+          <a:bodyPr rtlCol="0" anchor="ctr"/>
+          <a:lstStyle/>
+          <a:p>
+            <a:r>
+              <a:rPr lang="en-US" sz="1600" dirty="0">
+                <a:solidFill>
+                  <a:schemeClr val="tx1"/>
+                </a:solidFill>
+              </a:rPr>
+              <a:t>Output is a probability distribution over all possible values</a:t>
+            </a:r>
+          </a:p>
+        </p:txBody>
+      </p:sp>
+    </p:spTree>
+    <p:extLst>
+      <p:ext uri="{BB962C8B-B14F-4D97-AF65-F5344CB8AC3E}">
+        <p14:creationId xmlns:p14="http://schemas.microsoft.com/office/powerpoint/2010/main" val="2536614698"/>
       </p:ext>
     </p:extLst>
   </p:cSld>
@@ -16407,18 +15725,18 @@
 </file>
 
 <file path=customXml/item1.xml><?xml version="1.0" encoding="utf-8"?>
+<p:properties xmlns:p="http://schemas.microsoft.com/office/2006/metadata/properties" xmlns:xsi="http://www.w3.org/2001/XMLSchema-instance" xmlns:pc="http://schemas.microsoft.com/office/infopath/2007/PartnerControls">
+  <documentManagement/>
+</p:properties>
+</file>
+
+<file path=customXml/item2.xml><?xml version="1.0" encoding="utf-8"?>
 <?mso-contentType ?>
 <FormTemplates xmlns="http://schemas.microsoft.com/sharepoint/v3/contenttype/forms">
   <Display>DocumentLibraryForm</Display>
   <Edit>DocumentLibraryForm</Edit>
   <New>DocumentLibraryForm</New>
 </FormTemplates>
-</file>
-
-<file path=customXml/item2.xml><?xml version="1.0" encoding="utf-8"?>
-<p:properties xmlns:p="http://schemas.microsoft.com/office/2006/metadata/properties" xmlns:xsi="http://www.w3.org/2001/XMLSchema-instance" xmlns:pc="http://schemas.microsoft.com/office/infopath/2007/PartnerControls">
-  <documentManagement/>
-</p:properties>
 </file>
 
 <file path=customXml/item3.xml><?xml version="1.0" encoding="utf-8"?>
@@ -16627,14 +15945,6 @@
 </file>
 
 <file path=customXml/itemProps1.xml><?xml version="1.0" encoding="utf-8"?>
-<ds:datastoreItem xmlns:ds="http://schemas.openxmlformats.org/officeDocument/2006/customXml" ds:itemID="{4A9C8777-C6EC-4528-A529-B1E15BCDF7A3}">
-  <ds:schemaRefs>
-    <ds:schemaRef ds:uri="http://schemas.microsoft.com/sharepoint/v3/contenttype/forms"/>
-  </ds:schemaRefs>
-</ds:datastoreItem>
-</file>
-
-<file path=customXml/itemProps2.xml><?xml version="1.0" encoding="utf-8"?>
 <ds:datastoreItem xmlns:ds="http://schemas.openxmlformats.org/officeDocument/2006/customXml" ds:itemID="{D1B4FFAB-A2D9-4FD5-855F-F65126373F7D}">
   <ds:schemaRefs>
     <ds:schemaRef ds:uri="http://schemas.openxmlformats.org/package/2006/metadata/core-properties"/>
@@ -16647,6 +15957,14 @@
     <ds:schemaRef ds:uri="a9a9e2ba-2d19-46fe-bf54-0255447a607c"/>
     <ds:schemaRef ds:uri="http://www.w3.org/XML/1998/namespace"/>
     <ds:schemaRef ds:uri="http://purl.org/dc/dcmitype/"/>
+  </ds:schemaRefs>
+</ds:datastoreItem>
+</file>
+
+<file path=customXml/itemProps2.xml><?xml version="1.0" encoding="utf-8"?>
+<ds:datastoreItem xmlns:ds="http://schemas.openxmlformats.org/officeDocument/2006/customXml" ds:itemID="{4A9C8777-C6EC-4528-A529-B1E15BCDF7A3}">
+  <ds:schemaRefs>
+    <ds:schemaRef ds:uri="http://schemas.microsoft.com/sharepoint/v3/contenttype/forms"/>
   </ds:schemaRefs>
 </ds:datastoreItem>
 </file>

</xml_diff>